<commit_message>
Rebranded slides to NSCU DSA
</commit_message>
<xml_diff>
--- a/M0_Intro_Workshop/M0_Introdution_Course.pptx
+++ b/M0_Intro_Workshop/M0_Introdution_Course.pptx
@@ -270,7 +270,7 @@
           <a:p>
             <a:fld id="{9F69634C-F75C-45F7-A87A-C5E2AF3ECA41}" type="datetimeFigureOut">
               <a:rPr lang="en-US" smtClean="0"/>
-              <a:t>1/1/2024</a:t>
+              <a:t>1/9/24</a:t>
             </a:fld>
             <a:endParaRPr lang="en-US"/>
           </a:p>
@@ -434,7 +434,7 @@
           <a:p>
             <a:fld id="{9F69634C-F75C-45F7-A87A-C5E2AF3ECA41}" type="datetimeFigureOut">
               <a:rPr lang="en-US" smtClean="0"/>
-              <a:t>1/1/2024</a:t>
+              <a:t>1/9/24</a:t>
             </a:fld>
             <a:endParaRPr lang="en-US"/>
           </a:p>
@@ -637,7 +637,7 @@
           <a:p>
             <a:fld id="{9F69634C-F75C-45F7-A87A-C5E2AF3ECA41}" type="datetimeFigureOut">
               <a:rPr lang="en-US" smtClean="0"/>
-              <a:t>1/1/2024</a:t>
+              <a:t>1/9/24</a:t>
             </a:fld>
             <a:endParaRPr lang="en-US"/>
           </a:p>
@@ -902,7 +902,7 @@
           <a:p>
             <a:fld id="{9F69634C-F75C-45F7-A87A-C5E2AF3ECA41}" type="datetimeFigureOut">
               <a:rPr lang="en-US" smtClean="0"/>
-              <a:t>1/1/2024</a:t>
+              <a:t>1/9/24</a:t>
             </a:fld>
             <a:endParaRPr lang="en-US"/>
           </a:p>
@@ -1015,7 +1015,7 @@
           <a:p>
             <a:fld id="{9F69634C-F75C-45F7-A87A-C5E2AF3ECA41}" type="datetimeFigureOut">
               <a:rPr lang="en-US" smtClean="0"/>
-              <a:t>1/1/2024</a:t>
+              <a:t>1/9/24</a:t>
             </a:fld>
             <a:endParaRPr lang="en-US"/>
           </a:p>
@@ -1181,35 +1181,35 @@
           <a:p>
             <a:pPr lvl="0"/>
             <a:r>
-              <a:rPr lang="en-US"/>
+              <a:rPr lang="en-US" dirty="0"/>
               <a:t>Click to edit Master text styles</a:t>
             </a:r>
           </a:p>
           <a:p>
             <a:pPr lvl="1"/>
             <a:r>
-              <a:rPr lang="en-US"/>
+              <a:rPr lang="en-US" dirty="0"/>
               <a:t>Second level</a:t>
             </a:r>
           </a:p>
           <a:p>
             <a:pPr lvl="2"/>
             <a:r>
-              <a:rPr lang="en-US"/>
+              <a:rPr lang="en-US" dirty="0"/>
               <a:t>Third level</a:t>
             </a:r>
           </a:p>
           <a:p>
             <a:pPr lvl="3"/>
             <a:r>
-              <a:rPr lang="en-US"/>
+              <a:rPr lang="en-US" dirty="0"/>
               <a:t>Fourth level</a:t>
             </a:r>
           </a:p>
           <a:p>
             <a:pPr lvl="4"/>
             <a:r>
-              <a:rPr lang="en-US"/>
+              <a:rPr lang="en-US" dirty="0"/>
               <a:t>Fifth level</a:t>
             </a:r>
           </a:p>
@@ -1256,7 +1256,7 @@
           <a:p>
             <a:fld id="{9F69634C-F75C-45F7-A87A-C5E2AF3ECA41}" type="datetimeFigureOut">
               <a:rPr lang="en-US" smtClean="0"/>
-              <a:t>1/1/2024</a:t>
+              <a:t>1/9/24</a:t>
             </a:fld>
             <a:endParaRPr lang="en-US"/>
           </a:p>
@@ -1352,12 +1352,149 @@
           </a:p>
         </p:txBody>
       </p:sp>
+      <p:pic>
+        <p:nvPicPr>
+          <p:cNvPr id="12" name="Picture 4">
+            <a:extLst>
+              <a:ext uri="{FF2B5EF4-FFF2-40B4-BE49-F238E27FC236}">
+                <a16:creationId xmlns:a16="http://schemas.microsoft.com/office/drawing/2014/main" id="{D057B878-12E1-E213-DD5D-E8C3B95DEE30}"/>
+              </a:ext>
+            </a:extLst>
+          </p:cNvPr>
+          <p:cNvPicPr>
+            <a:picLocks noChangeAspect="1" noChangeArrowheads="1"/>
+          </p:cNvPicPr>
+          <p:nvPr/>
+        </p:nvPicPr>
+        <p:blipFill rotWithShape="1">
+          <a:blip r:embed="rId7">
+            <a:extLst>
+              <a:ext uri="{28A0092B-C50C-407E-A947-70E740481C1C}">
+                <a14:useLocalDpi xmlns:a14="http://schemas.microsoft.com/office/drawing/2010/main" val="0"/>
+              </a:ext>
+            </a:extLst>
+          </a:blip>
+          <a:srcRect r="92190"/>
+          <a:stretch/>
+        </p:blipFill>
+        <p:spPr bwMode="auto">
+          <a:xfrm>
+            <a:off x="11657405" y="6405597"/>
+            <a:ext cx="440780" cy="369373"/>
+          </a:xfrm>
+          <a:prstGeom prst="rect">
+            <a:avLst/>
+          </a:prstGeom>
+          <a:solidFill>
+            <a:schemeClr val="bg1"/>
+          </a:solidFill>
+        </p:spPr>
+      </p:pic>
+      <p:sp>
+        <p:nvSpPr>
+          <p:cNvPr id="10" name="Rectangle 9">
+            <a:extLst>
+              <a:ext uri="{FF2B5EF4-FFF2-40B4-BE49-F238E27FC236}">
+                <a16:creationId xmlns:a16="http://schemas.microsoft.com/office/drawing/2014/main" id="{96165629-9282-59A2-3252-22C976A32FCB}"/>
+              </a:ext>
+            </a:extLst>
+          </p:cNvPr>
+          <p:cNvSpPr/>
+          <p:nvPr/>
+        </p:nvSpPr>
+        <p:spPr>
+          <a:xfrm>
+            <a:off x="10327568" y="6413419"/>
+            <a:ext cx="162346" cy="369035"/>
+          </a:xfrm>
+          <a:prstGeom prst="rect">
+            <a:avLst/>
+          </a:prstGeom>
+          <a:solidFill>
+            <a:schemeClr val="bg1"/>
+          </a:solidFill>
+          <a:ln>
+            <a:noFill/>
+          </a:ln>
+        </p:spPr>
+        <p:style>
+          <a:lnRef idx="2">
+            <a:schemeClr val="accent1">
+              <a:shade val="15000"/>
+            </a:schemeClr>
+          </a:lnRef>
+          <a:fillRef idx="1">
+            <a:schemeClr val="accent1"/>
+          </a:fillRef>
+          <a:effectRef idx="0">
+            <a:schemeClr val="accent1"/>
+          </a:effectRef>
+          <a:fontRef idx="minor">
+            <a:schemeClr val="lt1"/>
+          </a:fontRef>
+        </p:style>
+        <p:txBody>
+          <a:bodyPr rtlCol="0" anchor="ctr"/>
+          <a:lstStyle/>
+          <a:p>
+            <a:pPr algn="ctr"/>
+            <a:endParaRPr lang="en-US" dirty="0"/>
+          </a:p>
+        </p:txBody>
+      </p:sp>
+      <p:pic>
+        <p:nvPicPr>
+          <p:cNvPr id="11" name="Picture 6">
+            <a:extLst>
+              <a:ext uri="{FF2B5EF4-FFF2-40B4-BE49-F238E27FC236}">
+                <a16:creationId xmlns:a16="http://schemas.microsoft.com/office/drawing/2014/main" id="{BDB1A56D-B0BB-83FA-A9E4-F4640EAC0465}"/>
+              </a:ext>
+            </a:extLst>
+          </p:cNvPr>
+          <p:cNvPicPr>
+            <a:picLocks noChangeAspect="1" noChangeArrowheads="1"/>
+          </p:cNvPicPr>
+          <p:nvPr/>
+        </p:nvPicPr>
+        <p:blipFill>
+          <a:blip r:embed="rId8">
+            <a:extLst>
+              <a:ext uri="{28A0092B-C50C-407E-A947-70E740481C1C}">
+                <a14:useLocalDpi xmlns:a14="http://schemas.microsoft.com/office/drawing/2010/main" val="0"/>
+              </a:ext>
+            </a:extLst>
+          </a:blip>
+          <a:srcRect/>
+          <a:stretch>
+            <a:fillRect/>
+          </a:stretch>
+        </p:blipFill>
+        <p:spPr bwMode="auto">
+          <a:xfrm>
+            <a:off x="10095781" y="6356350"/>
+            <a:ext cx="398897" cy="474984"/>
+          </a:xfrm>
+          <a:prstGeom prst="rect">
+            <a:avLst/>
+          </a:prstGeom>
+          <a:noFill/>
+          <a:extLst>
+            <a:ext uri="{909E8E84-426E-40DD-AFC4-6F175D3DCCD1}">
+              <a14:hiddenFill xmlns:a14="http://schemas.microsoft.com/office/drawing/2010/main">
+                <a:solidFill>
+                  <a:srgbClr val="FFFFFF"/>
+                </a:solidFill>
+              </a14:hiddenFill>
+            </a:ext>
+          </a:extLst>
+        </p:spPr>
+      </p:pic>
       <p:grpSp>
         <p:nvGrpSpPr>
-          <p:cNvPr id="7" name="Group 6">
-            <a:extLst>
-              <a:ext uri="{FF2B5EF4-FFF2-40B4-BE49-F238E27FC236}">
-                <a16:creationId xmlns:a16="http://schemas.microsoft.com/office/drawing/2014/main" id="{3880AF11-16A2-55D9-35F9-3011E625EF70}"/>
+          <p:cNvPr id="21" name="Group 20">
+            <a:extLst>
+              <a:ext uri="{FF2B5EF4-FFF2-40B4-BE49-F238E27FC236}">
+                <a16:creationId xmlns:a16="http://schemas.microsoft.com/office/drawing/2014/main" id="{AE6847B1-0652-4F82-C0D7-6BB9058EF211}"/>
               </a:ext>
             </a:extLst>
           </p:cNvPr>
@@ -1366,298 +1503,239 @@
         </p:nvGrpSpPr>
         <p:grpSpPr>
           <a:xfrm>
-            <a:off x="9894613" y="6356350"/>
-            <a:ext cx="2184040" cy="474984"/>
-            <a:chOff x="6968939" y="4628992"/>
-            <a:chExt cx="2184040" cy="474984"/>
+            <a:off x="10421120" y="6361244"/>
+            <a:ext cx="1358031" cy="470621"/>
+            <a:chOff x="10250948" y="6361244"/>
+            <a:chExt cx="1358031" cy="470621"/>
           </a:xfrm>
         </p:grpSpPr>
-        <p:grpSp>
-          <p:nvGrpSpPr>
-            <p:cNvPr id="8" name="Group 7">
+        <p:sp>
+          <p:nvSpPr>
+            <p:cNvPr id="15" name="TextBox 14">
               <a:extLst>
                 <a:ext uri="{FF2B5EF4-FFF2-40B4-BE49-F238E27FC236}">
-                  <a16:creationId xmlns:a16="http://schemas.microsoft.com/office/drawing/2014/main" id="{84C8740E-3DF3-283B-1B9D-2CB3D9C4471B}"/>
+                  <a16:creationId xmlns:a16="http://schemas.microsoft.com/office/drawing/2014/main" id="{8E43C571-9C77-A5A7-27CB-DF2E8AB20A94}"/>
                 </a:ext>
               </a:extLst>
             </p:cNvPr>
-            <p:cNvGrpSpPr/>
-            <p:nvPr/>
-          </p:nvGrpSpPr>
-          <p:grpSpPr>
-            <a:xfrm>
-              <a:off x="7355930" y="4685723"/>
-              <a:ext cx="1797049" cy="369373"/>
-              <a:chOff x="7200939" y="4475698"/>
-              <a:chExt cx="2356037" cy="553721"/>
-            </a:xfrm>
-          </p:grpSpPr>
-          <p:pic>
-            <p:nvPicPr>
-              <p:cNvPr id="12" name="Picture 4">
-                <a:extLst>
-                  <a:ext uri="{FF2B5EF4-FFF2-40B4-BE49-F238E27FC236}">
-                    <a16:creationId xmlns:a16="http://schemas.microsoft.com/office/drawing/2014/main" id="{D057B878-12E1-E213-DD5D-E8C3B95DEE30}"/>
-                  </a:ext>
-                </a:extLst>
-              </p:cNvPr>
-              <p:cNvPicPr>
-                <a:picLocks noChangeAspect="1" noChangeArrowheads="1"/>
-              </p:cNvPicPr>
-              <p:nvPr/>
-            </p:nvPicPr>
-            <p:blipFill rotWithShape="1">
-              <a:blip r:embed="rId7">
-                <a:extLst>
-                  <a:ext uri="{28A0092B-C50C-407E-A947-70E740481C1C}">
-                    <a14:useLocalDpi xmlns:a14="http://schemas.microsoft.com/office/drawing/2010/main" val="0"/>
-                  </a:ext>
-                </a:extLst>
-              </a:blip>
-              <a:srcRect r="92190"/>
-              <a:stretch/>
-            </p:blipFill>
-            <p:spPr bwMode="auto">
-              <a:xfrm>
-                <a:off x="8979087" y="4475698"/>
-                <a:ext cx="577889" cy="553721"/>
-              </a:xfrm>
-              <a:prstGeom prst="rect">
-                <a:avLst/>
-              </a:prstGeom>
-              <a:solidFill>
-                <a:schemeClr val="bg1"/>
-              </a:solidFill>
-            </p:spPr>
-          </p:pic>
-          <p:pic>
-            <p:nvPicPr>
-              <p:cNvPr id="13" name="Picture 4">
-                <a:extLst>
-                  <a:ext uri="{FF2B5EF4-FFF2-40B4-BE49-F238E27FC236}">
-                    <a16:creationId xmlns:a16="http://schemas.microsoft.com/office/drawing/2014/main" id="{2B54BAA7-B091-625A-15EF-81A9D3492307}"/>
-                  </a:ext>
-                </a:extLst>
-              </p:cNvPr>
-              <p:cNvPicPr>
-                <a:picLocks noChangeAspect="1" noChangeArrowheads="1"/>
-              </p:cNvPicPr>
-              <p:nvPr/>
-            </p:nvPicPr>
-            <p:blipFill rotWithShape="1">
-              <a:blip r:embed="rId7">
-                <a:extLst>
-                  <a:ext uri="{28A0092B-C50C-407E-A947-70E740481C1C}">
-                    <a14:useLocalDpi xmlns:a14="http://schemas.microsoft.com/office/drawing/2010/main" val="0"/>
-                  </a:ext>
-                </a:extLst>
-              </a:blip>
-              <a:srcRect l="8050" r="48505"/>
-              <a:stretch/>
-            </p:blipFill>
-            <p:spPr bwMode="auto">
-              <a:xfrm>
-                <a:off x="7200940" y="4477604"/>
-                <a:ext cx="1592647" cy="274320"/>
-              </a:xfrm>
-              <a:prstGeom prst="rect">
-                <a:avLst/>
-              </a:prstGeom>
-              <a:solidFill>
-                <a:schemeClr val="bg1"/>
-              </a:solidFill>
-            </p:spPr>
-          </p:pic>
-          <p:pic>
-            <p:nvPicPr>
-              <p:cNvPr id="14" name="Picture 4">
-                <a:extLst>
-                  <a:ext uri="{FF2B5EF4-FFF2-40B4-BE49-F238E27FC236}">
-                    <a16:creationId xmlns:a16="http://schemas.microsoft.com/office/drawing/2014/main" id="{87022AEC-3D98-9BE2-CB82-643603D2DD9B}"/>
-                  </a:ext>
-                </a:extLst>
-              </p:cNvPr>
-              <p:cNvPicPr>
-                <a:picLocks noChangeAspect="1" noChangeArrowheads="1"/>
-              </p:cNvPicPr>
-              <p:nvPr/>
-            </p:nvPicPr>
-            <p:blipFill rotWithShape="1">
-              <a:blip r:embed="rId7">
-                <a:extLst>
-                  <a:ext uri="{28A0092B-C50C-407E-A947-70E740481C1C}">
-                    <a14:useLocalDpi xmlns:a14="http://schemas.microsoft.com/office/drawing/2010/main" val="0"/>
-                  </a:ext>
-                </a:extLst>
-              </a:blip>
-              <a:srcRect l="51495"/>
-              <a:stretch/>
-            </p:blipFill>
-            <p:spPr bwMode="auto">
-              <a:xfrm>
-                <a:off x="7200939" y="4755099"/>
-                <a:ext cx="1778149" cy="274320"/>
-              </a:xfrm>
-              <a:prstGeom prst="rect">
-                <a:avLst/>
-              </a:prstGeom>
-              <a:solidFill>
-                <a:schemeClr val="bg1"/>
-              </a:solidFill>
-            </p:spPr>
-          </p:pic>
-        </p:grpSp>
-        <p:sp>
-          <p:nvSpPr>
-            <p:cNvPr id="9" name="Rectangle 8">
-              <a:extLst>
-                <a:ext uri="{FF2B5EF4-FFF2-40B4-BE49-F238E27FC236}">
-                  <a16:creationId xmlns:a16="http://schemas.microsoft.com/office/drawing/2014/main" id="{71DD8890-BC8E-533E-DA38-99A724B6EC7B}"/>
-                </a:ext>
-              </a:extLst>
-            </p:cNvPr>
-            <p:cNvSpPr/>
-            <p:nvPr/>
+            <p:cNvSpPr txBox="1"/>
+            <p:nvPr userDrawn="1"/>
           </p:nvSpPr>
           <p:spPr>
             <a:xfrm>
-              <a:off x="8562554" y="4686061"/>
-              <a:ext cx="162346" cy="209789"/>
+              <a:off x="10288746" y="6401527"/>
+              <a:ext cx="1320233" cy="427618"/>
             </a:xfrm>
             <a:prstGeom prst="rect">
               <a:avLst/>
             </a:prstGeom>
-            <a:solidFill>
-              <a:schemeClr val="bg1"/>
-            </a:solidFill>
-            <a:ln>
-              <a:noFill/>
-            </a:ln>
+            <a:noFill/>
           </p:spPr>
-          <p:style>
-            <a:lnRef idx="2">
-              <a:schemeClr val="accent1">
-                <a:shade val="15000"/>
-              </a:schemeClr>
-            </a:lnRef>
-            <a:fillRef idx="1">
-              <a:schemeClr val="accent1"/>
-            </a:fillRef>
-            <a:effectRef idx="0">
-              <a:schemeClr val="accent1"/>
-            </a:effectRef>
-            <a:fontRef idx="minor">
-              <a:schemeClr val="lt1"/>
-            </a:fontRef>
-          </p:style>
           <p:txBody>
-            <a:bodyPr rtlCol="0" anchor="ctr"/>
+            <a:bodyPr wrap="none" rtlCol="0">
+              <a:spAutoFit/>
+            </a:bodyPr>
             <a:lstStyle/>
             <a:p>
-              <a:pPr algn="ctr"/>
-              <a:endParaRPr lang="en-US" dirty="0"/>
+              <a:pPr>
+                <a:lnSpc>
+                  <a:spcPts val="1280"/>
+                </a:lnSpc>
+              </a:pPr>
+              <a:r>
+                <a:rPr lang="en-US" sz="1400" spc="-50" baseline="0" dirty="0">
+                  <a:latin typeface="Arial Unicode MS" panose="020B0604020202020204" pitchFamily="34" charset="-128"/>
+                  <a:ea typeface="Arial Unicode MS" panose="020B0604020202020204" pitchFamily="34" charset="-128"/>
+                  <a:cs typeface="Arial Unicode MS" panose="020B0604020202020204" pitchFamily="34" charset="-128"/>
+                </a:rPr>
+                <a:t>  </a:t>
+              </a:r>
+              <a:r>
+                <a:rPr lang="en-US" sz="1200" spc="-100" baseline="0" dirty="0">
+                  <a:latin typeface="Arial Unicode MS" panose="020B0604020202020204" pitchFamily="34" charset="-128"/>
+                  <a:ea typeface="Arial Unicode MS" panose="020B0604020202020204" pitchFamily="34" charset="-128"/>
+                  <a:cs typeface="Arial Unicode MS" panose="020B0604020202020204" pitchFamily="34" charset="-128"/>
+                </a:rPr>
+                <a:t>ATA</a:t>
+              </a:r>
+              <a:r>
+                <a:rPr lang="en-US" sz="1200" spc="-50" baseline="0" dirty="0">
+                  <a:latin typeface="Arial Unicode MS" panose="020B0604020202020204" pitchFamily="34" charset="-128"/>
+                  <a:ea typeface="Arial Unicode MS" panose="020B0604020202020204" pitchFamily="34" charset="-128"/>
+                  <a:cs typeface="Arial Unicode MS" panose="020B0604020202020204" pitchFamily="34" charset="-128"/>
+                </a:rPr>
+                <a:t> </a:t>
+              </a:r>
+              <a:r>
+                <a:rPr lang="en-US" sz="1400" spc="-50" baseline="0" dirty="0">
+                  <a:latin typeface="Arial Unicode MS" panose="020B0604020202020204" pitchFamily="34" charset="-128"/>
+                  <a:ea typeface="Arial Unicode MS" panose="020B0604020202020204" pitchFamily="34" charset="-128"/>
+                  <a:cs typeface="Arial Unicode MS" panose="020B0604020202020204" pitchFamily="34" charset="-128"/>
+                </a:rPr>
+                <a:t>   </a:t>
+              </a:r>
+              <a:r>
+                <a:rPr lang="en-US" sz="1200" spc="-20" baseline="0" dirty="0">
+                  <a:latin typeface="Arial Unicode MS" panose="020B0604020202020204" pitchFamily="34" charset="-128"/>
+                  <a:ea typeface="Arial Unicode MS" panose="020B0604020202020204" pitchFamily="34" charset="-128"/>
+                  <a:cs typeface="Arial Unicode MS" panose="020B0604020202020204" pitchFamily="34" charset="-128"/>
+                </a:rPr>
+                <a:t>CIENCE</a:t>
+              </a:r>
+              <a:r>
+                <a:rPr lang="en-US" sz="1200" spc="-50" baseline="0" dirty="0">
+                  <a:latin typeface="Arial Unicode MS" panose="020B0604020202020204" pitchFamily="34" charset="-128"/>
+                  <a:ea typeface="Arial Unicode MS" panose="020B0604020202020204" pitchFamily="34" charset="-128"/>
+                  <a:cs typeface="Arial Unicode MS" panose="020B0604020202020204" pitchFamily="34" charset="-128"/>
+                </a:rPr>
+                <a:t> </a:t>
+              </a:r>
+            </a:p>
+            <a:p>
+              <a:pPr>
+                <a:lnSpc>
+                  <a:spcPts val="1280"/>
+                </a:lnSpc>
+              </a:pPr>
+              <a:r>
+                <a:rPr lang="en-US" sz="1400" spc="-50" baseline="0" dirty="0">
+                  <a:latin typeface="Arial Unicode MS" panose="020B0604020202020204" pitchFamily="34" charset="-128"/>
+                  <a:ea typeface="Arial Unicode MS" panose="020B0604020202020204" pitchFamily="34" charset="-128"/>
+                  <a:cs typeface="Arial Unicode MS" panose="020B0604020202020204" pitchFamily="34" charset="-128"/>
+                </a:rPr>
+                <a:t>  </a:t>
+              </a:r>
+              <a:r>
+                <a:rPr lang="en-US" sz="1200" spc="-10" baseline="0" dirty="0">
+                  <a:latin typeface="Arial Unicode MS" panose="020B0604020202020204" pitchFamily="34" charset="-128"/>
+                  <a:ea typeface="Arial Unicode MS" panose="020B0604020202020204" pitchFamily="34" charset="-128"/>
+                  <a:cs typeface="Arial Unicode MS" panose="020B0604020202020204" pitchFamily="34" charset="-128"/>
+                </a:rPr>
+                <a:t>CADEMY</a:t>
+              </a:r>
             </a:p>
           </p:txBody>
         </p:sp>
         <p:sp>
           <p:nvSpPr>
-            <p:cNvPr id="10" name="Rectangle 9">
+            <p:cNvPr id="18" name="TextBox 17">
               <a:extLst>
                 <a:ext uri="{FF2B5EF4-FFF2-40B4-BE49-F238E27FC236}">
-                  <a16:creationId xmlns:a16="http://schemas.microsoft.com/office/drawing/2014/main" id="{96165629-9282-59A2-3252-22C976A32FCB}"/>
+                  <a16:creationId xmlns:a16="http://schemas.microsoft.com/office/drawing/2014/main" id="{0A9B7E82-3AE1-1ED0-9C75-D904117A350C}"/>
                 </a:ext>
               </a:extLst>
             </p:cNvPr>
-            <p:cNvSpPr/>
-            <p:nvPr/>
+            <p:cNvSpPr txBox="1"/>
+            <p:nvPr userDrawn="1"/>
           </p:nvSpPr>
           <p:spPr>
             <a:xfrm>
-              <a:off x="7200726" y="4686061"/>
-              <a:ext cx="162346" cy="369035"/>
-            </a:xfrm>
-            <a:prstGeom prst="rect">
-              <a:avLst/>
-            </a:prstGeom>
-            <a:solidFill>
-              <a:schemeClr val="bg1"/>
-            </a:solidFill>
-            <a:ln>
-              <a:noFill/>
-            </a:ln>
-          </p:spPr>
-          <p:style>
-            <a:lnRef idx="2">
-              <a:schemeClr val="accent1">
-                <a:shade val="15000"/>
-              </a:schemeClr>
-            </a:lnRef>
-            <a:fillRef idx="1">
-              <a:schemeClr val="accent1"/>
-            </a:fillRef>
-            <a:effectRef idx="0">
-              <a:schemeClr val="accent1"/>
-            </a:effectRef>
-            <a:fontRef idx="minor">
-              <a:schemeClr val="lt1"/>
-            </a:fontRef>
-          </p:style>
-          <p:txBody>
-            <a:bodyPr rtlCol="0" anchor="ctr"/>
-            <a:lstStyle/>
-            <a:p>
-              <a:pPr algn="ctr"/>
-              <a:endParaRPr lang="en-US" dirty="0"/>
-            </a:p>
-          </p:txBody>
-        </p:sp>
-        <p:pic>
-          <p:nvPicPr>
-            <p:cNvPr id="11" name="Picture 6">
-              <a:extLst>
-                <a:ext uri="{FF2B5EF4-FFF2-40B4-BE49-F238E27FC236}">
-                  <a16:creationId xmlns:a16="http://schemas.microsoft.com/office/drawing/2014/main" id="{BDB1A56D-B0BB-83FA-A9E4-F4640EAC0465}"/>
-                </a:ext>
-              </a:extLst>
-            </p:cNvPr>
-            <p:cNvPicPr>
-              <a:picLocks noChangeAspect="1" noChangeArrowheads="1"/>
-            </p:cNvPicPr>
-            <p:nvPr/>
-          </p:nvPicPr>
-          <p:blipFill>
-            <a:blip r:embed="rId8">
-              <a:extLst>
-                <a:ext uri="{28A0092B-C50C-407E-A947-70E740481C1C}">
-                  <a14:useLocalDpi xmlns:a14="http://schemas.microsoft.com/office/drawing/2010/main" val="0"/>
-                </a:ext>
-              </a:extLst>
-            </a:blip>
-            <a:srcRect/>
-            <a:stretch>
-              <a:fillRect/>
-            </a:stretch>
-          </p:blipFill>
-          <p:spPr bwMode="auto">
-            <a:xfrm>
-              <a:off x="6968939" y="4628992"/>
-              <a:ext cx="398897" cy="474984"/>
+              <a:off x="10250948" y="6365476"/>
+              <a:ext cx="247116" cy="307777"/>
             </a:xfrm>
             <a:prstGeom prst="rect">
               <a:avLst/>
             </a:prstGeom>
             <a:noFill/>
-            <a:extLst>
-              <a:ext uri="{909E8E84-426E-40DD-AFC4-6F175D3DCCD1}">
-                <a14:hiddenFill xmlns:a14="http://schemas.microsoft.com/office/drawing/2010/main">
-                  <a:solidFill>
-                    <a:srgbClr val="FFFFFF"/>
-                  </a:solidFill>
-                </a14:hiddenFill>
-              </a:ext>
-            </a:extLst>
           </p:spPr>
-        </p:pic>
+          <p:txBody>
+            <a:bodyPr wrap="square">
+              <a:spAutoFit/>
+            </a:bodyPr>
+            <a:lstStyle/>
+            <a:p>
+              <a:r>
+                <a:rPr lang="en-US" sz="1400" spc="-50" baseline="0" dirty="0">
+                  <a:latin typeface="Arial Unicode MS" panose="020B0604020202020204" pitchFamily="34" charset="-128"/>
+                  <a:ea typeface="Arial Unicode MS" panose="020B0604020202020204" pitchFamily="34" charset="-128"/>
+                  <a:cs typeface="Arial Unicode MS" panose="020B0604020202020204" pitchFamily="34" charset="-128"/>
+                </a:rPr>
+                <a:t>D</a:t>
+              </a:r>
+              <a:endParaRPr lang="en-US" sz="1400" dirty="0"/>
+            </a:p>
+          </p:txBody>
+        </p:sp>
+        <p:sp>
+          <p:nvSpPr>
+            <p:cNvPr id="19" name="TextBox 18">
+              <a:extLst>
+                <a:ext uri="{FF2B5EF4-FFF2-40B4-BE49-F238E27FC236}">
+                  <a16:creationId xmlns:a16="http://schemas.microsoft.com/office/drawing/2014/main" id="{166948DE-BE55-32BF-3755-41B53C339311}"/>
+                </a:ext>
+              </a:extLst>
+            </p:cNvPr>
+            <p:cNvSpPr txBox="1"/>
+            <p:nvPr userDrawn="1"/>
+          </p:nvSpPr>
+          <p:spPr>
+            <a:xfrm>
+              <a:off x="10686216" y="6361244"/>
+              <a:ext cx="247116" cy="307777"/>
+            </a:xfrm>
+            <a:prstGeom prst="rect">
+              <a:avLst/>
+            </a:prstGeom>
+            <a:noFill/>
+          </p:spPr>
+          <p:txBody>
+            <a:bodyPr wrap="square">
+              <a:spAutoFit/>
+            </a:bodyPr>
+            <a:lstStyle/>
+            <a:p>
+              <a:r>
+                <a:rPr lang="en-US" sz="1400" spc="-50" baseline="0" dirty="0">
+                  <a:latin typeface="Arial Unicode MS" panose="020B0604020202020204" pitchFamily="34" charset="-128"/>
+                  <a:ea typeface="Arial Unicode MS" panose="020B0604020202020204" pitchFamily="34" charset="-128"/>
+                  <a:cs typeface="Arial Unicode MS" panose="020B0604020202020204" pitchFamily="34" charset="-128"/>
+                </a:rPr>
+                <a:t>S</a:t>
+              </a:r>
+              <a:endParaRPr lang="en-US" sz="1400" dirty="0"/>
+            </a:p>
+          </p:txBody>
+        </p:sp>
+        <p:sp>
+          <p:nvSpPr>
+            <p:cNvPr id="20" name="TextBox 19">
+              <a:extLst>
+                <a:ext uri="{FF2B5EF4-FFF2-40B4-BE49-F238E27FC236}">
+                  <a16:creationId xmlns:a16="http://schemas.microsoft.com/office/drawing/2014/main" id="{220460B7-E159-6953-8B40-5396511A4476}"/>
+                </a:ext>
+              </a:extLst>
+            </p:cNvPr>
+            <p:cNvSpPr txBox="1"/>
+            <p:nvPr userDrawn="1"/>
+          </p:nvSpPr>
+          <p:spPr>
+            <a:xfrm>
+              <a:off x="10260092" y="6524088"/>
+              <a:ext cx="247116" cy="307777"/>
+            </a:xfrm>
+            <a:prstGeom prst="rect">
+              <a:avLst/>
+            </a:prstGeom>
+            <a:noFill/>
+          </p:spPr>
+          <p:txBody>
+            <a:bodyPr wrap="square">
+              <a:spAutoFit/>
+            </a:bodyPr>
+            <a:lstStyle/>
+            <a:p>
+              <a:r>
+                <a:rPr lang="en-US" sz="1400" spc="-50" baseline="0" dirty="0">
+                  <a:latin typeface="Arial Unicode MS" panose="020B0604020202020204" pitchFamily="34" charset="-128"/>
+                  <a:ea typeface="Arial Unicode MS" panose="020B0604020202020204" pitchFamily="34" charset="-128"/>
+                  <a:cs typeface="Arial Unicode MS" panose="020B0604020202020204" pitchFamily="34" charset="-128"/>
+                </a:rPr>
+                <a:t>A</a:t>
+              </a:r>
+              <a:endParaRPr lang="en-US" sz="1400" dirty="0"/>
+            </a:p>
+          </p:txBody>
+        </p:sp>
       </p:grpSp>
     </p:spTree>
     <p:extLst>

</xml_diff>

<commit_message>
Added script for monocle analysis for zebra D5 and D10. Still lacking cell type identification.
</commit_message>
<xml_diff>
--- a/M0_Intro_Workshop/M0_Introdution_Course.pptx
+++ b/M0_Intro_Workshop/M0_Introdution_Course.pptx
@@ -9,6 +9,8 @@
     <p:sldId id="257" r:id="rId3"/>
     <p:sldId id="260" r:id="rId4"/>
     <p:sldId id="261" r:id="rId5"/>
+    <p:sldId id="263" r:id="rId6"/>
+    <p:sldId id="262" r:id="rId7"/>
   </p:sldIdLst>
   <p:sldSz cx="12192000" cy="6858000"/>
   <p:notesSz cx="6858000" cy="9144000"/>
@@ -270,7 +272,7 @@
           <a:p>
             <a:fld id="{9F69634C-F75C-45F7-A87A-C5E2AF3ECA41}" type="datetimeFigureOut">
               <a:rPr lang="en-US" smtClean="0"/>
-              <a:t>1/9/2024</a:t>
+              <a:t>3/5/2024</a:t>
             </a:fld>
             <a:endParaRPr lang="en-US"/>
           </a:p>
@@ -434,7 +436,7 @@
           <a:p>
             <a:fld id="{9F69634C-F75C-45F7-A87A-C5E2AF3ECA41}" type="datetimeFigureOut">
               <a:rPr lang="en-US" smtClean="0"/>
-              <a:t>1/9/2024</a:t>
+              <a:t>3/5/2024</a:t>
             </a:fld>
             <a:endParaRPr lang="en-US"/>
           </a:p>
@@ -637,7 +639,7 @@
           <a:p>
             <a:fld id="{9F69634C-F75C-45F7-A87A-C5E2AF3ECA41}" type="datetimeFigureOut">
               <a:rPr lang="en-US" smtClean="0"/>
-              <a:t>1/9/2024</a:t>
+              <a:t>3/5/2024</a:t>
             </a:fld>
             <a:endParaRPr lang="en-US"/>
           </a:p>
@@ -902,7 +904,7 @@
           <a:p>
             <a:fld id="{9F69634C-F75C-45F7-A87A-C5E2AF3ECA41}" type="datetimeFigureOut">
               <a:rPr lang="en-US" smtClean="0"/>
-              <a:t>1/9/2024</a:t>
+              <a:t>3/5/2024</a:t>
             </a:fld>
             <a:endParaRPr lang="en-US"/>
           </a:p>
@@ -1015,7 +1017,7 @@
           <a:p>
             <a:fld id="{9F69634C-F75C-45F7-A87A-C5E2AF3ECA41}" type="datetimeFigureOut">
               <a:rPr lang="en-US" smtClean="0"/>
-              <a:t>1/9/2024</a:t>
+              <a:t>3/5/2024</a:t>
             </a:fld>
             <a:endParaRPr lang="en-US"/>
           </a:p>
@@ -1256,7 +1258,7 @@
           <a:p>
             <a:fld id="{9F69634C-F75C-45F7-A87A-C5E2AF3ECA41}" type="datetimeFigureOut">
               <a:rPr lang="en-US" smtClean="0"/>
-              <a:t>1/9/2024</a:t>
+              <a:t>3/5/2024</a:t>
             </a:fld>
             <a:endParaRPr lang="en-US"/>
           </a:p>
@@ -2420,7 +2422,7 @@
         </p:nvSpPr>
         <p:spPr>
           <a:xfrm>
-            <a:off x="658368" y="2029968"/>
+            <a:off x="466344" y="2971800"/>
             <a:ext cx="7173182" cy="1477328"/>
           </a:xfrm>
           <a:prstGeom prst="rect">
@@ -2492,6 +2494,41 @@
             <a:r>
               <a:rPr lang="en-US" dirty="0"/>
               <a:t> data.</a:t>
+            </a:r>
+          </a:p>
+        </p:txBody>
+      </p:sp>
+      <p:sp>
+        <p:nvSpPr>
+          <p:cNvPr id="4" name="TextBox 3">
+            <a:extLst>
+              <a:ext uri="{FF2B5EF4-FFF2-40B4-BE49-F238E27FC236}">
+                <a16:creationId xmlns:a16="http://schemas.microsoft.com/office/drawing/2014/main" id="{37C6ECF8-D496-670E-A9DF-AE4459849618}"/>
+              </a:ext>
+            </a:extLst>
+          </p:cNvPr>
+          <p:cNvSpPr txBox="1"/>
+          <p:nvPr/>
+        </p:nvSpPr>
+        <p:spPr>
+          <a:xfrm>
+            <a:off x="621793" y="1246488"/>
+            <a:ext cx="4892039" cy="646331"/>
+          </a:xfrm>
+          <a:prstGeom prst="rect">
+            <a:avLst/>
+          </a:prstGeom>
+          <a:noFill/>
+        </p:spPr>
+        <p:txBody>
+          <a:bodyPr wrap="square" rtlCol="0">
+            <a:spAutoFit/>
+          </a:bodyPr>
+          <a:lstStyle/>
+          <a:p>
+            <a:r>
+              <a:rPr lang="en-US" dirty="0"/>
+              <a:t>Overarching Purpose: to help participants beat the steep learning curve</a:t>
             </a:r>
           </a:p>
         </p:txBody>
@@ -2558,6 +2595,508 @@
     <p:extLst>
       <p:ext uri="{BB962C8B-B14F-4D97-AF65-F5344CB8AC3E}">
         <p14:creationId xmlns:p14="http://schemas.microsoft.com/office/powerpoint/2010/main" val="237000122"/>
+      </p:ext>
+    </p:extLst>
+  </p:cSld>
+  <p:clrMapOvr>
+    <a:masterClrMapping/>
+  </p:clrMapOvr>
+</p:sld>
+</file>
+
+<file path=ppt/slides/slide5.xml><?xml version="1.0" encoding="utf-8"?>
+<p:sld xmlns:a="http://schemas.openxmlformats.org/drawingml/2006/main" xmlns:r="http://schemas.openxmlformats.org/officeDocument/2006/relationships" xmlns:p="http://schemas.openxmlformats.org/presentationml/2006/main">
+  <p:cSld>
+    <p:spTree>
+      <p:nvGrpSpPr>
+        <p:cNvPr id="1" name="">
+          <a:extLst>
+            <a:ext uri="{FF2B5EF4-FFF2-40B4-BE49-F238E27FC236}">
+              <a16:creationId xmlns:a16="http://schemas.microsoft.com/office/drawing/2014/main" id="{8B106114-4F2C-F8B7-6B66-F462A0434C03}"/>
+            </a:ext>
+          </a:extLst>
+        </p:cNvPr>
+        <p:cNvGrpSpPr/>
+        <p:nvPr/>
+      </p:nvGrpSpPr>
+      <p:grpSpPr>
+        <a:xfrm>
+          <a:off x="0" y="0"/>
+          <a:ext cx="0" cy="0"/>
+          <a:chOff x="0" y="0"/>
+          <a:chExt cx="0" cy="0"/>
+        </a:xfrm>
+      </p:grpSpPr>
+      <p:sp>
+        <p:nvSpPr>
+          <p:cNvPr id="2" name="Title 1">
+            <a:extLst>
+              <a:ext uri="{FF2B5EF4-FFF2-40B4-BE49-F238E27FC236}">
+                <a16:creationId xmlns:a16="http://schemas.microsoft.com/office/drawing/2014/main" id="{F7D491B1-B53E-F0C3-4E3E-81543A1A5AA5}"/>
+              </a:ext>
+            </a:extLst>
+          </p:cNvPr>
+          <p:cNvSpPr>
+            <a:spLocks noGrp="1"/>
+          </p:cNvSpPr>
+          <p:nvPr>
+            <p:ph type="title"/>
+          </p:nvPr>
+        </p:nvSpPr>
+        <p:spPr/>
+        <p:txBody>
+          <a:bodyPr/>
+          <a:lstStyle/>
+          <a:p>
+            <a:r>
+              <a:rPr lang="en-US" dirty="0"/>
+              <a:t>The Teaching Dataset</a:t>
+            </a:r>
+          </a:p>
+        </p:txBody>
+      </p:sp>
+      <p:pic>
+        <p:nvPicPr>
+          <p:cNvPr id="4" name="Picture 3">
+            <a:extLst>
+              <a:ext uri="{FF2B5EF4-FFF2-40B4-BE49-F238E27FC236}">
+                <a16:creationId xmlns:a16="http://schemas.microsoft.com/office/drawing/2014/main" id="{5B11B819-D77B-04E7-7002-ABC3F5D46576}"/>
+              </a:ext>
+            </a:extLst>
+          </p:cNvPr>
+          <p:cNvPicPr>
+            <a:picLocks noChangeAspect="1"/>
+          </p:cNvPicPr>
+          <p:nvPr/>
+        </p:nvPicPr>
+        <p:blipFill rotWithShape="1">
+          <a:blip r:embed="rId2"/>
+          <a:srcRect t="1" r="9631" b="69"/>
+          <a:stretch/>
+        </p:blipFill>
+        <p:spPr>
+          <a:xfrm>
+            <a:off x="100055" y="1939655"/>
+            <a:ext cx="5472377" cy="4192325"/>
+          </a:xfrm>
+          <a:prstGeom prst="rect">
+            <a:avLst/>
+          </a:prstGeom>
+        </p:spPr>
+      </p:pic>
+      <p:pic>
+        <p:nvPicPr>
+          <p:cNvPr id="6" name="Picture 5">
+            <a:extLst>
+              <a:ext uri="{FF2B5EF4-FFF2-40B4-BE49-F238E27FC236}">
+                <a16:creationId xmlns:a16="http://schemas.microsoft.com/office/drawing/2014/main" id="{CA4089C1-1545-C49C-1EEA-BFA1364F10AF}"/>
+              </a:ext>
+            </a:extLst>
+          </p:cNvPr>
+          <p:cNvPicPr>
+            <a:picLocks noChangeAspect="1"/>
+          </p:cNvPicPr>
+          <p:nvPr/>
+        </p:nvPicPr>
+        <p:blipFill>
+          <a:blip r:embed="rId3"/>
+          <a:stretch>
+            <a:fillRect/>
+          </a:stretch>
+        </p:blipFill>
+        <p:spPr>
+          <a:xfrm>
+            <a:off x="100055" y="921404"/>
+            <a:ext cx="2600580" cy="629173"/>
+          </a:xfrm>
+          <a:prstGeom prst="rect">
+            <a:avLst/>
+          </a:prstGeom>
+        </p:spPr>
+      </p:pic>
+      <p:sp>
+        <p:nvSpPr>
+          <p:cNvPr id="8" name="TextBox 7">
+            <a:extLst>
+              <a:ext uri="{FF2B5EF4-FFF2-40B4-BE49-F238E27FC236}">
+                <a16:creationId xmlns:a16="http://schemas.microsoft.com/office/drawing/2014/main" id="{8CFCFA52-A930-0260-0B78-C65C7FDF1201}"/>
+              </a:ext>
+            </a:extLst>
+          </p:cNvPr>
+          <p:cNvSpPr txBox="1"/>
+          <p:nvPr/>
+        </p:nvSpPr>
+        <p:spPr>
+          <a:xfrm>
+            <a:off x="157344" y="1310482"/>
+            <a:ext cx="4493966" cy="584775"/>
+          </a:xfrm>
+          <a:prstGeom prst="rect">
+            <a:avLst/>
+          </a:prstGeom>
+          <a:noFill/>
+        </p:spPr>
+        <p:txBody>
+          <a:bodyPr wrap="square">
+            <a:spAutoFit/>
+          </a:bodyPr>
+          <a:lstStyle/>
+          <a:p>
+            <a:r>
+              <a:rPr lang="en-US" sz="1600" b="0" i="0" dirty="0">
+                <a:solidFill>
+                  <a:srgbClr val="333333"/>
+                </a:solidFill>
+                <a:effectLst/>
+                <a:latin typeface="Hoorah"/>
+              </a:rPr>
+              <a:t>Peripheral blood mononuclear cells (PBMCs) from a healthy donor</a:t>
+            </a:r>
+            <a:endParaRPr lang="en-US" sz="1600" dirty="0"/>
+          </a:p>
+        </p:txBody>
+      </p:sp>
+      <p:pic>
+        <p:nvPicPr>
+          <p:cNvPr id="1026" name="Picture 2" descr="PBMCs – The One Stop Immune Cell Shop | Lonza">
+            <a:extLst>
+              <a:ext uri="{FF2B5EF4-FFF2-40B4-BE49-F238E27FC236}">
+                <a16:creationId xmlns:a16="http://schemas.microsoft.com/office/drawing/2014/main" id="{25F429F7-D766-4201-7CEE-66177BD4A480}"/>
+              </a:ext>
+            </a:extLst>
+          </p:cNvPr>
+          <p:cNvPicPr>
+            <a:picLocks noChangeAspect="1" noChangeArrowheads="1"/>
+          </p:cNvPicPr>
+          <p:nvPr/>
+        </p:nvPicPr>
+        <p:blipFill rotWithShape="1">
+          <a:blip r:embed="rId4">
+            <a:extLst>
+              <a:ext uri="{28A0092B-C50C-407E-A947-70E740481C1C}">
+                <a14:useLocalDpi xmlns:a14="http://schemas.microsoft.com/office/drawing/2010/main" val="0"/>
+              </a:ext>
+            </a:extLst>
+          </a:blip>
+          <a:srcRect t="4667" b="3041"/>
+          <a:stretch/>
+        </p:blipFill>
+        <p:spPr bwMode="auto">
+          <a:xfrm>
+            <a:off x="6264119" y="1105952"/>
+            <a:ext cx="4916450" cy="3403078"/>
+          </a:xfrm>
+          <a:prstGeom prst="rect">
+            <a:avLst/>
+          </a:prstGeom>
+          <a:noFill/>
+          <a:extLst>
+            <a:ext uri="{909E8E84-426E-40DD-AFC4-6F175D3DCCD1}">
+              <a14:hiddenFill xmlns:a14="http://schemas.microsoft.com/office/drawing/2010/main">
+                <a:solidFill>
+                  <a:srgbClr val="FFFFFF"/>
+                </a:solidFill>
+              </a14:hiddenFill>
+            </a:ext>
+          </a:extLst>
+        </p:spPr>
+      </p:pic>
+      <p:sp>
+        <p:nvSpPr>
+          <p:cNvPr id="9" name="TextBox 8">
+            <a:extLst>
+              <a:ext uri="{FF2B5EF4-FFF2-40B4-BE49-F238E27FC236}">
+                <a16:creationId xmlns:a16="http://schemas.microsoft.com/office/drawing/2014/main" id="{0FB01FE2-CF91-5754-1097-D0FC20DA0384}"/>
+              </a:ext>
+            </a:extLst>
+          </p:cNvPr>
+          <p:cNvSpPr txBox="1"/>
+          <p:nvPr/>
+        </p:nvSpPr>
+        <p:spPr>
+          <a:xfrm>
+            <a:off x="5793157" y="4764914"/>
+            <a:ext cx="5858374" cy="1477328"/>
+          </a:xfrm>
+          <a:prstGeom prst="rect">
+            <a:avLst/>
+          </a:prstGeom>
+          <a:noFill/>
+        </p:spPr>
+        <p:txBody>
+          <a:bodyPr wrap="square" rtlCol="0">
+            <a:spAutoFit/>
+          </a:bodyPr>
+          <a:lstStyle/>
+          <a:p>
+            <a:r>
+              <a:rPr lang="en-US" dirty="0"/>
+              <a:t>Used for </a:t>
+            </a:r>
+            <a:r>
+              <a:rPr lang="en-US" b="1" dirty="0"/>
+              <a:t>all </a:t>
+            </a:r>
+            <a:r>
+              <a:rPr lang="en-US" b="1" dirty="0" err="1"/>
+              <a:t>powerpoints</a:t>
+            </a:r>
+            <a:r>
+              <a:rPr lang="en-US" b="1" dirty="0"/>
+              <a:t> </a:t>
+            </a:r>
+            <a:r>
+              <a:rPr lang="en-US" dirty="0"/>
+              <a:t>and the </a:t>
+            </a:r>
+            <a:r>
+              <a:rPr lang="en-US" b="1" dirty="0" err="1"/>
+              <a:t>test_pipeline.R</a:t>
+            </a:r>
+            <a:r>
+              <a:rPr lang="en-US" b="1" dirty="0"/>
+              <a:t> script</a:t>
+            </a:r>
+            <a:r>
+              <a:rPr lang="en-US" dirty="0"/>
+              <a:t>.</a:t>
+            </a:r>
+          </a:p>
+          <a:p>
+            <a:endParaRPr lang="en-US" dirty="0"/>
+          </a:p>
+          <a:p>
+            <a:r>
+              <a:rPr lang="en-US" dirty="0"/>
+              <a:t>Artificially altered for Dataset Integration, Differential Gene Expression, and Cell Trajectory/ </a:t>
+            </a:r>
+            <a:r>
+              <a:rPr lang="en-US" dirty="0" err="1"/>
+              <a:t>Pseudotime</a:t>
+            </a:r>
+            <a:r>
+              <a:rPr lang="en-US" dirty="0"/>
+              <a:t> Analysis to illustrate the </a:t>
+            </a:r>
+            <a:r>
+              <a:rPr lang="en-US" b="1" i="1" u="sng" dirty="0"/>
+              <a:t>null</a:t>
+            </a:r>
+            <a:r>
+              <a:rPr lang="en-US" b="1" u="sng" dirty="0"/>
+              <a:t> case</a:t>
+            </a:r>
+            <a:r>
+              <a:rPr lang="en-US" dirty="0"/>
+              <a:t>.</a:t>
+            </a:r>
+          </a:p>
+        </p:txBody>
+      </p:sp>
+    </p:spTree>
+    <p:extLst>
+      <p:ext uri="{BB962C8B-B14F-4D97-AF65-F5344CB8AC3E}">
+        <p14:creationId xmlns:p14="http://schemas.microsoft.com/office/powerpoint/2010/main" val="1331816970"/>
+      </p:ext>
+    </p:extLst>
+  </p:cSld>
+  <p:clrMapOvr>
+    <a:masterClrMapping/>
+  </p:clrMapOvr>
+</p:sld>
+</file>
+
+<file path=ppt/slides/slide6.xml><?xml version="1.0" encoding="utf-8"?>
+<p:sld xmlns:a="http://schemas.openxmlformats.org/drawingml/2006/main" xmlns:r="http://schemas.openxmlformats.org/officeDocument/2006/relationships" xmlns:p="http://schemas.openxmlformats.org/presentationml/2006/main">
+  <p:cSld>
+    <p:spTree>
+      <p:nvGrpSpPr>
+        <p:cNvPr id="1" name=""/>
+        <p:cNvGrpSpPr/>
+        <p:nvPr/>
+      </p:nvGrpSpPr>
+      <p:grpSpPr>
+        <a:xfrm>
+          <a:off x="0" y="0"/>
+          <a:ext cx="0" cy="0"/>
+          <a:chOff x="0" y="0"/>
+          <a:chExt cx="0" cy="0"/>
+        </a:xfrm>
+      </p:grpSpPr>
+      <p:sp>
+        <p:nvSpPr>
+          <p:cNvPr id="2" name="Title 1">
+            <a:extLst>
+              <a:ext uri="{FF2B5EF4-FFF2-40B4-BE49-F238E27FC236}">
+                <a16:creationId xmlns:a16="http://schemas.microsoft.com/office/drawing/2014/main" id="{E948918B-607A-D68B-8FB7-16078C1EBA93}"/>
+              </a:ext>
+            </a:extLst>
+          </p:cNvPr>
+          <p:cNvSpPr>
+            <a:spLocks noGrp="1"/>
+          </p:cNvSpPr>
+          <p:nvPr>
+            <p:ph type="title"/>
+          </p:nvPr>
+        </p:nvSpPr>
+        <p:spPr/>
+        <p:txBody>
+          <a:bodyPr/>
+          <a:lstStyle/>
+          <a:p>
+            <a:r>
+              <a:rPr lang="en-US" dirty="0"/>
+              <a:t>The Teaching Dataset</a:t>
+            </a:r>
+          </a:p>
+        </p:txBody>
+      </p:sp>
+      <p:pic>
+        <p:nvPicPr>
+          <p:cNvPr id="11" name="Picture 10">
+            <a:extLst>
+              <a:ext uri="{FF2B5EF4-FFF2-40B4-BE49-F238E27FC236}">
+                <a16:creationId xmlns:a16="http://schemas.microsoft.com/office/drawing/2014/main" id="{0F7AAFD9-EDC0-9054-1960-2F3555CCFFE2}"/>
+              </a:ext>
+            </a:extLst>
+          </p:cNvPr>
+          <p:cNvPicPr>
+            <a:picLocks noChangeAspect="1"/>
+          </p:cNvPicPr>
+          <p:nvPr/>
+        </p:nvPicPr>
+        <p:blipFill>
+          <a:blip r:embed="rId2"/>
+          <a:stretch>
+            <a:fillRect/>
+          </a:stretch>
+        </p:blipFill>
+        <p:spPr>
+          <a:xfrm>
+            <a:off x="8256596" y="4404342"/>
+            <a:ext cx="3718596" cy="2137964"/>
+          </a:xfrm>
+          <a:prstGeom prst="rect">
+            <a:avLst/>
+          </a:prstGeom>
+        </p:spPr>
+      </p:pic>
+      <p:pic>
+        <p:nvPicPr>
+          <p:cNvPr id="13" name="Picture 12">
+            <a:extLst>
+              <a:ext uri="{FF2B5EF4-FFF2-40B4-BE49-F238E27FC236}">
+                <a16:creationId xmlns:a16="http://schemas.microsoft.com/office/drawing/2014/main" id="{689D9F17-4443-84A5-2FCA-9F38677F04D4}"/>
+              </a:ext>
+            </a:extLst>
+          </p:cNvPr>
+          <p:cNvPicPr>
+            <a:picLocks noChangeAspect="1"/>
+          </p:cNvPicPr>
+          <p:nvPr/>
+        </p:nvPicPr>
+        <p:blipFill>
+          <a:blip r:embed="rId3"/>
+          <a:stretch>
+            <a:fillRect/>
+          </a:stretch>
+        </p:blipFill>
+        <p:spPr>
+          <a:xfrm>
+            <a:off x="65951" y="1101011"/>
+            <a:ext cx="2665939" cy="1626297"/>
+          </a:xfrm>
+          <a:prstGeom prst="rect">
+            <a:avLst/>
+          </a:prstGeom>
+        </p:spPr>
+      </p:pic>
+      <p:pic>
+        <p:nvPicPr>
+          <p:cNvPr id="15" name="Picture 14">
+            <a:extLst>
+              <a:ext uri="{FF2B5EF4-FFF2-40B4-BE49-F238E27FC236}">
+                <a16:creationId xmlns:a16="http://schemas.microsoft.com/office/drawing/2014/main" id="{A0B5B73B-1808-BF20-2DDD-94E1DA127BEA}"/>
+              </a:ext>
+            </a:extLst>
+          </p:cNvPr>
+          <p:cNvPicPr>
+            <a:picLocks noChangeAspect="1"/>
+          </p:cNvPicPr>
+          <p:nvPr/>
+        </p:nvPicPr>
+        <p:blipFill>
+          <a:blip r:embed="rId4"/>
+          <a:stretch>
+            <a:fillRect/>
+          </a:stretch>
+        </p:blipFill>
+        <p:spPr>
+          <a:xfrm>
+            <a:off x="7132330" y="-101694"/>
+            <a:ext cx="4534533" cy="4286848"/>
+          </a:xfrm>
+          <a:prstGeom prst="rect">
+            <a:avLst/>
+          </a:prstGeom>
+        </p:spPr>
+      </p:pic>
+      <p:sp>
+        <p:nvSpPr>
+          <p:cNvPr id="17" name="TextBox 16">
+            <a:extLst>
+              <a:ext uri="{FF2B5EF4-FFF2-40B4-BE49-F238E27FC236}">
+                <a16:creationId xmlns:a16="http://schemas.microsoft.com/office/drawing/2014/main" id="{F5B0A8AF-7063-BECE-1738-0E9E16D97D7D}"/>
+              </a:ext>
+            </a:extLst>
+          </p:cNvPr>
+          <p:cNvSpPr txBox="1"/>
+          <p:nvPr/>
+        </p:nvSpPr>
+        <p:spPr>
+          <a:xfrm>
+            <a:off x="525137" y="3199146"/>
+            <a:ext cx="6190860" cy="1477328"/>
+          </a:xfrm>
+          <a:prstGeom prst="rect">
+            <a:avLst/>
+          </a:prstGeom>
+          <a:noFill/>
+        </p:spPr>
+        <p:txBody>
+          <a:bodyPr wrap="square">
+            <a:spAutoFit/>
+          </a:bodyPr>
+          <a:lstStyle/>
+          <a:p>
+            <a:r>
+              <a:rPr lang="en-US" b="0" i="0" dirty="0" err="1">
+                <a:solidFill>
+                  <a:srgbClr val="000000"/>
+                </a:solidFill>
+                <a:effectLst/>
+                <a:latin typeface="Hanken Grotesk"/>
+              </a:rPr>
+              <a:t>Zebrahub</a:t>
+            </a:r>
+            <a:r>
+              <a:rPr lang="en-US" b="0" i="0" dirty="0">
+                <a:solidFill>
+                  <a:srgbClr val="000000"/>
+                </a:solidFill>
+                <a:effectLst/>
+                <a:latin typeface="Hanken Grotesk"/>
+              </a:rPr>
+              <a:t> is a comprehensive atlas of zebrafish embryonic development that combines single-cell RNA sequencing and live light-sheet imaging. Its aim is to provide a complete cartography of cellular lineages in space, time, and molecular domains, an essential step toward understanding how organisms develop.</a:t>
+            </a:r>
+            <a:endParaRPr lang="en-US" dirty="0"/>
+          </a:p>
+        </p:txBody>
+      </p:sp>
+    </p:spTree>
+    <p:extLst>
+      <p:ext uri="{BB962C8B-B14F-4D97-AF65-F5344CB8AC3E}">
+        <p14:creationId xmlns:p14="http://schemas.microsoft.com/office/powerpoint/2010/main" val="2024582942"/>
       </p:ext>
     </p:extLst>
   </p:cSld>

</xml_diff>

<commit_message>
Updates to M0 and M7
</commit_message>
<xml_diff>
--- a/M0_Intro_Workshop/M0_Introdution_Course.pptx
+++ b/M0_Intro_Workshop/M0_Introdution_Course.pptx
@@ -11,6 +11,7 @@
     <p:sldId id="261" r:id="rId5"/>
     <p:sldId id="263" r:id="rId6"/>
     <p:sldId id="262" r:id="rId7"/>
+    <p:sldId id="264" r:id="rId8"/>
   </p:sldIdLst>
   <p:sldSz cx="12192000" cy="6858000"/>
   <p:notesSz cx="6858000" cy="9144000"/>
@@ -272,7 +273,7 @@
           <a:p>
             <a:fld id="{9F69634C-F75C-45F7-A87A-C5E2AF3ECA41}" type="datetimeFigureOut">
               <a:rPr lang="en-US" smtClean="0"/>
-              <a:t>3/5/2024</a:t>
+              <a:t>3/31/2024</a:t>
             </a:fld>
             <a:endParaRPr lang="en-US"/>
           </a:p>
@@ -436,7 +437,7 @@
           <a:p>
             <a:fld id="{9F69634C-F75C-45F7-A87A-C5E2AF3ECA41}" type="datetimeFigureOut">
               <a:rPr lang="en-US" smtClean="0"/>
-              <a:t>3/5/2024</a:t>
+              <a:t>3/31/2024</a:t>
             </a:fld>
             <a:endParaRPr lang="en-US"/>
           </a:p>
@@ -639,7 +640,7 @@
           <a:p>
             <a:fld id="{9F69634C-F75C-45F7-A87A-C5E2AF3ECA41}" type="datetimeFigureOut">
               <a:rPr lang="en-US" smtClean="0"/>
-              <a:t>3/5/2024</a:t>
+              <a:t>3/31/2024</a:t>
             </a:fld>
             <a:endParaRPr lang="en-US"/>
           </a:p>
@@ -904,7 +905,7 @@
           <a:p>
             <a:fld id="{9F69634C-F75C-45F7-A87A-C5E2AF3ECA41}" type="datetimeFigureOut">
               <a:rPr lang="en-US" smtClean="0"/>
-              <a:t>3/5/2024</a:t>
+              <a:t>3/31/2024</a:t>
             </a:fld>
             <a:endParaRPr lang="en-US"/>
           </a:p>
@@ -1017,7 +1018,7 @@
           <a:p>
             <a:fld id="{9F69634C-F75C-45F7-A87A-C5E2AF3ECA41}" type="datetimeFigureOut">
               <a:rPr lang="en-US" smtClean="0"/>
-              <a:t>3/5/2024</a:t>
+              <a:t>3/31/2024</a:t>
             </a:fld>
             <a:endParaRPr lang="en-US"/>
           </a:p>
@@ -1258,7 +1259,7 @@
           <a:p>
             <a:fld id="{9F69634C-F75C-45F7-A87A-C5E2AF3ECA41}" type="datetimeFigureOut">
               <a:rPr lang="en-US" smtClean="0"/>
-              <a:t>3/5/2024</a:t>
+              <a:t>3/31/2024</a:t>
             </a:fld>
             <a:endParaRPr lang="en-US"/>
           </a:p>
@@ -2201,8 +2202,8 @@
         </p:nvSpPr>
         <p:spPr>
           <a:xfrm>
-            <a:off x="2450659" y="1411850"/>
-            <a:ext cx="1882247" cy="646331"/>
+            <a:off x="2350075" y="863129"/>
+            <a:ext cx="3727624" cy="923330"/>
           </a:xfrm>
           <a:prstGeom prst="rect">
             <a:avLst/>
@@ -2218,6 +2219,12 @@
             <a:r>
               <a:rPr lang="en-US" dirty="0"/>
               <a:t>Bruce Corliss, PhD</a:t>
+            </a:r>
+          </a:p>
+          <a:p>
+            <a:r>
+              <a:rPr lang="en-US" dirty="0"/>
+              <a:t>Research Bioinformatician at NC State</a:t>
             </a:r>
           </a:p>
           <a:p>
@@ -2253,7 +2260,7 @@
         </p:blipFill>
         <p:spPr>
           <a:xfrm>
-            <a:off x="208094" y="735113"/>
+            <a:off x="162374" y="863129"/>
             <a:ext cx="2040583" cy="2160943"/>
           </a:xfrm>
           <a:prstGeom prst="rect">
@@ -2676,8 +2683,8 @@
         </p:blipFill>
         <p:spPr>
           <a:xfrm>
-            <a:off x="100055" y="1939655"/>
-            <a:ext cx="5472377" cy="4192325"/>
+            <a:off x="302725" y="1939655"/>
+            <a:ext cx="5614945" cy="4301545"/>
           </a:xfrm>
           <a:prstGeom prst="rect">
             <a:avLst/>
@@ -2706,7 +2713,7 @@
         </p:blipFill>
         <p:spPr>
           <a:xfrm>
-            <a:off x="100055" y="921404"/>
+            <a:off x="0" y="655241"/>
             <a:ext cx="2600580" cy="629173"/>
           </a:xfrm>
           <a:prstGeom prst="rect">
@@ -2728,7 +2735,7 @@
         </p:nvSpPr>
         <p:spPr>
           <a:xfrm>
-            <a:off x="157344" y="1310482"/>
+            <a:off x="184776" y="1105952"/>
             <a:ext cx="4493966" cy="584775"/>
           </a:xfrm>
           <a:prstGeom prst="rect">
@@ -2783,7 +2790,7 @@
         </p:blipFill>
         <p:spPr bwMode="auto">
           <a:xfrm>
-            <a:off x="6264119" y="1105952"/>
+            <a:off x="6218399" y="1197392"/>
             <a:ext cx="4916450" cy="3403078"/>
           </a:xfrm>
           <a:prstGeom prst="rect">
@@ -2815,7 +2822,7 @@
         </p:nvSpPr>
         <p:spPr>
           <a:xfrm>
-            <a:off x="5793157" y="4764914"/>
+            <a:off x="6030901" y="4763872"/>
             <a:ext cx="5858374" cy="1477328"/>
           </a:xfrm>
           <a:prstGeom prst="rect">
@@ -2879,11 +2886,11 @@
               <a:t> Analysis to illustrate the </a:t>
             </a:r>
             <a:r>
-              <a:rPr lang="en-US" b="1" i="1" u="sng" dirty="0"/>
+              <a:rPr lang="en-US" b="1" i="1" dirty="0"/>
               <a:t>null</a:t>
             </a:r>
             <a:r>
-              <a:rPr lang="en-US" b="1" u="sng" dirty="0"/>
+              <a:rPr lang="en-US" b="1" dirty="0"/>
               <a:t> case</a:t>
             </a:r>
             <a:r>
@@ -2946,7 +2953,7 @@
           <a:p>
             <a:r>
               <a:rPr lang="en-US" dirty="0"/>
-              <a:t>The Teaching Dataset</a:t>
+              <a:t>The Interactive Dataset</a:t>
             </a:r>
           </a:p>
         </p:txBody>
@@ -2973,7 +2980,7 @@
         </p:blipFill>
         <p:spPr>
           <a:xfrm>
-            <a:off x="8256596" y="4404342"/>
+            <a:off x="8003504" y="80193"/>
             <a:ext cx="3718596" cy="2137964"/>
           </a:xfrm>
           <a:prstGeom prst="rect">
@@ -2981,82 +2988,22 @@
           </a:prstGeom>
         </p:spPr>
       </p:pic>
-      <p:pic>
-        <p:nvPicPr>
-          <p:cNvPr id="13" name="Picture 12">
-            <a:extLst>
-              <a:ext uri="{FF2B5EF4-FFF2-40B4-BE49-F238E27FC236}">
-                <a16:creationId xmlns:a16="http://schemas.microsoft.com/office/drawing/2014/main" id="{689D9F17-4443-84A5-2FCA-9F38677F04D4}"/>
-              </a:ext>
-            </a:extLst>
-          </p:cNvPr>
-          <p:cNvPicPr>
-            <a:picLocks noChangeAspect="1"/>
-          </p:cNvPicPr>
+      <p:sp>
+        <p:nvSpPr>
+          <p:cNvPr id="17" name="TextBox 16">
+            <a:extLst>
+              <a:ext uri="{FF2B5EF4-FFF2-40B4-BE49-F238E27FC236}">
+                <a16:creationId xmlns:a16="http://schemas.microsoft.com/office/drawing/2014/main" id="{F5B0A8AF-7063-BECE-1738-0E9E16D97D7D}"/>
+              </a:ext>
+            </a:extLst>
+          </p:cNvPr>
+          <p:cNvSpPr txBox="1"/>
           <p:nvPr/>
-        </p:nvPicPr>
-        <p:blipFill>
-          <a:blip r:embed="rId3"/>
-          <a:stretch>
-            <a:fillRect/>
-          </a:stretch>
-        </p:blipFill>
+        </p:nvSpPr>
         <p:spPr>
           <a:xfrm>
-            <a:off x="65951" y="1101011"/>
-            <a:ext cx="2665939" cy="1626297"/>
-          </a:xfrm>
-          <a:prstGeom prst="rect">
-            <a:avLst/>
-          </a:prstGeom>
-        </p:spPr>
-      </p:pic>
-      <p:pic>
-        <p:nvPicPr>
-          <p:cNvPr id="15" name="Picture 14">
-            <a:extLst>
-              <a:ext uri="{FF2B5EF4-FFF2-40B4-BE49-F238E27FC236}">
-                <a16:creationId xmlns:a16="http://schemas.microsoft.com/office/drawing/2014/main" id="{A0B5B73B-1808-BF20-2DDD-94E1DA127BEA}"/>
-              </a:ext>
-            </a:extLst>
-          </p:cNvPr>
-          <p:cNvPicPr>
-            <a:picLocks noChangeAspect="1"/>
-          </p:cNvPicPr>
-          <p:nvPr/>
-        </p:nvPicPr>
-        <p:blipFill>
-          <a:blip r:embed="rId4"/>
-          <a:stretch>
-            <a:fillRect/>
-          </a:stretch>
-        </p:blipFill>
-        <p:spPr>
-          <a:xfrm>
-            <a:off x="7132330" y="-101694"/>
-            <a:ext cx="4534533" cy="4286848"/>
-          </a:xfrm>
-          <a:prstGeom prst="rect">
-            <a:avLst/>
-          </a:prstGeom>
-        </p:spPr>
-      </p:pic>
-      <p:sp>
-        <p:nvSpPr>
-          <p:cNvPr id="17" name="TextBox 16">
-            <a:extLst>
-              <a:ext uri="{FF2B5EF4-FFF2-40B4-BE49-F238E27FC236}">
-                <a16:creationId xmlns:a16="http://schemas.microsoft.com/office/drawing/2014/main" id="{F5B0A8AF-7063-BECE-1738-0E9E16D97D7D}"/>
-              </a:ext>
-            </a:extLst>
-          </p:cNvPr>
-          <p:cNvSpPr txBox="1"/>
-          <p:nvPr/>
-        </p:nvSpPr>
-        <p:spPr>
-          <a:xfrm>
-            <a:off x="525137" y="3199146"/>
-            <a:ext cx="6190860" cy="1477328"/>
+            <a:off x="309853" y="973508"/>
+            <a:ext cx="7383798" cy="1477328"/>
           </a:xfrm>
           <a:prstGeom prst="rect">
             <a:avLst/>
@@ -3070,7 +3017,7 @@
           <a:lstStyle/>
           <a:p>
             <a:r>
-              <a:rPr lang="en-US" b="0" i="0" dirty="0" err="1">
+              <a:rPr lang="en-US" b="1" i="0" dirty="0" err="1">
                 <a:solidFill>
                   <a:srgbClr val="000000"/>
                 </a:solidFill>
@@ -3087,16 +3034,613 @@
                 <a:effectLst/>
                 <a:latin typeface="Hanken Grotesk"/>
               </a:rPr>
-              <a:t> is a comprehensive atlas of zebrafish embryonic development that combines single-cell RNA sequencing and live light-sheet imaging. Its aim is to provide a complete cartography of cellular lineages in space, time, and molecular domains, an essential step toward understanding how organisms develop.</a:t>
-            </a:r>
-            <a:endParaRPr lang="en-US" dirty="0"/>
-          </a:p>
-        </p:txBody>
-      </p:sp>
+              <a:t> is a </a:t>
+            </a:r>
+            <a:r>
+              <a:rPr lang="en-US" b="0" dirty="0">
+                <a:solidFill>
+                  <a:srgbClr val="000000"/>
+                </a:solidFill>
+                <a:effectLst/>
+                <a:latin typeface="Hanken Grotesk"/>
+              </a:rPr>
+              <a:t>comprehensive atlas </a:t>
+            </a:r>
+            <a:r>
+              <a:rPr lang="en-US" b="0" i="0" dirty="0">
+                <a:solidFill>
+                  <a:srgbClr val="000000"/>
+                </a:solidFill>
+                <a:effectLst/>
+                <a:latin typeface="Hanken Grotesk"/>
+              </a:rPr>
+              <a:t>of </a:t>
+            </a:r>
+            <a:r>
+              <a:rPr lang="en-US" b="1" i="0" dirty="0">
+                <a:solidFill>
+                  <a:srgbClr val="000000"/>
+                </a:solidFill>
+                <a:effectLst/>
+                <a:latin typeface="Hanken Grotesk"/>
+              </a:rPr>
+              <a:t>zebrafish embryonic development</a:t>
+            </a:r>
+            <a:r>
+              <a:rPr lang="en-US" b="0" i="0" dirty="0">
+                <a:solidFill>
+                  <a:srgbClr val="000000"/>
+                </a:solidFill>
+                <a:effectLst/>
+                <a:latin typeface="Hanken Grotesk"/>
+              </a:rPr>
+              <a:t>.</a:t>
+            </a:r>
+          </a:p>
+          <a:p>
+            <a:r>
+              <a:rPr lang="en-US" b="1" dirty="0">
+                <a:solidFill>
+                  <a:srgbClr val="000000"/>
+                </a:solidFill>
+                <a:latin typeface="Hanken Grotesk"/>
+              </a:rPr>
+              <a:t>Technologies</a:t>
+            </a:r>
+            <a:r>
+              <a:rPr lang="en-US" dirty="0">
+                <a:solidFill>
+                  <a:srgbClr val="000000"/>
+                </a:solidFill>
+                <a:latin typeface="Hanken Grotesk"/>
+              </a:rPr>
+              <a:t>: </a:t>
+            </a:r>
+            <a:r>
+              <a:rPr lang="en-US" b="0" i="0" dirty="0">
+                <a:solidFill>
+                  <a:srgbClr val="000000"/>
+                </a:solidFill>
+                <a:effectLst/>
+                <a:latin typeface="Hanken Grotesk"/>
+              </a:rPr>
+              <a:t>single-cell RNA sequencing and live light-sheet imaging. </a:t>
+            </a:r>
+          </a:p>
+          <a:p>
+            <a:r>
+              <a:rPr lang="en-US" i="1" dirty="0">
+                <a:solidFill>
+                  <a:srgbClr val="000000"/>
+                </a:solidFill>
+                <a:latin typeface="Hanken Grotesk"/>
+              </a:rPr>
+              <a:t>   Provides </a:t>
+            </a:r>
+            <a:r>
+              <a:rPr lang="en-US" b="0" i="1" dirty="0">
+                <a:solidFill>
+                  <a:srgbClr val="000000"/>
+                </a:solidFill>
+                <a:effectLst/>
+                <a:latin typeface="Hanken Grotesk"/>
+              </a:rPr>
+              <a:t>a complete cartography of cellular lineages in space, time, and molecular domains, an essential step toward understanding how organisms develop.</a:t>
+            </a:r>
+            <a:endParaRPr lang="en-US" i="1" dirty="0"/>
+          </a:p>
+        </p:txBody>
+      </p:sp>
+      <p:sp>
+        <p:nvSpPr>
+          <p:cNvPr id="4" name="TextBox 3">
+            <a:extLst>
+              <a:ext uri="{FF2B5EF4-FFF2-40B4-BE49-F238E27FC236}">
+                <a16:creationId xmlns:a16="http://schemas.microsoft.com/office/drawing/2014/main" id="{972B816F-CBD8-5502-4587-CB2441502C24}"/>
+              </a:ext>
+            </a:extLst>
+          </p:cNvPr>
+          <p:cNvSpPr txBox="1"/>
+          <p:nvPr/>
+        </p:nvSpPr>
+        <p:spPr>
+          <a:xfrm>
+            <a:off x="411480" y="6386007"/>
+            <a:ext cx="6185916" cy="430887"/>
+          </a:xfrm>
+          <a:prstGeom prst="rect">
+            <a:avLst/>
+          </a:prstGeom>
+          <a:noFill/>
+        </p:spPr>
+        <p:txBody>
+          <a:bodyPr wrap="square">
+            <a:spAutoFit/>
+          </a:bodyPr>
+          <a:lstStyle/>
+          <a:p>
+            <a:r>
+              <a:rPr lang="en-US" sz="1050" b="0" i="1" dirty="0" err="1">
+                <a:solidFill>
+                  <a:srgbClr val="000000"/>
+                </a:solidFill>
+                <a:effectLst/>
+                <a:latin typeface="Hanken Grotesk"/>
+              </a:rPr>
+              <a:t>Zebrahub</a:t>
+            </a:r>
+            <a:r>
+              <a:rPr lang="en-US" sz="1050" b="0" i="1" dirty="0">
+                <a:solidFill>
+                  <a:srgbClr val="000000"/>
+                </a:solidFill>
+                <a:effectLst/>
+                <a:latin typeface="Hanken Grotesk"/>
+              </a:rPr>
+              <a:t> - Multimodal Zebrafish Developmental Atlas Reveals the State Transition Dynamics of Late Vertebrate Pluripotent Axial </a:t>
+            </a:r>
+            <a:r>
+              <a:rPr lang="en-US" sz="1050" b="0" i="0" u="none" strike="noStrike" dirty="0">
+                <a:solidFill>
+                  <a:srgbClr val="0D7CB5"/>
+                </a:solidFill>
+                <a:effectLst/>
+                <a:latin typeface="Hanken Grotesk"/>
+                <a:hlinkClick r:id="rId3" tooltip="zebrahub preprint"/>
+              </a:rPr>
+              <a:t>Progenitors</a:t>
+            </a:r>
+            <a:r>
+              <a:rPr lang="en-US" sz="1050" b="0" i="1" dirty="0">
+                <a:solidFill>
+                  <a:srgbClr val="000000"/>
+                </a:solidFill>
+                <a:effectLst/>
+                <a:latin typeface="Hanken Grotesk"/>
+              </a:rPr>
+              <a:t>.</a:t>
+            </a:r>
+            <a:r>
+              <a:rPr lang="en-US" sz="1050" b="0" i="0" dirty="0">
+                <a:solidFill>
+                  <a:srgbClr val="000000"/>
+                </a:solidFill>
+                <a:effectLst/>
+                <a:latin typeface="Hanken Grotesk"/>
+              </a:rPr>
+              <a:t> </a:t>
+            </a:r>
+            <a:r>
+              <a:rPr lang="en-US" sz="1050" b="1" i="0" dirty="0">
+                <a:solidFill>
+                  <a:srgbClr val="000000"/>
+                </a:solidFill>
+                <a:effectLst/>
+                <a:latin typeface="Hanken Grotesk"/>
+              </a:rPr>
+              <a:t>Lange et al. </a:t>
+            </a:r>
+            <a:r>
+              <a:rPr lang="en-US" sz="1050" b="1" i="0" dirty="0" err="1">
+                <a:solidFill>
+                  <a:srgbClr val="000000"/>
+                </a:solidFill>
+                <a:effectLst/>
+                <a:latin typeface="Hanken Grotesk"/>
+              </a:rPr>
+              <a:t>BioRxiv</a:t>
+            </a:r>
+            <a:r>
+              <a:rPr lang="en-US" sz="1050" b="1" i="0" dirty="0">
+                <a:solidFill>
+                  <a:srgbClr val="000000"/>
+                </a:solidFill>
+                <a:effectLst/>
+                <a:latin typeface="Hanken Grotesk"/>
+              </a:rPr>
+              <a:t> 2023.</a:t>
+            </a:r>
+            <a:endParaRPr lang="en-US" sz="1050" dirty="0"/>
+          </a:p>
+        </p:txBody>
+      </p:sp>
+      <p:pic>
+        <p:nvPicPr>
+          <p:cNvPr id="7" name="Picture 6" descr="A screenshot of a computer screen&#10;&#10;Description automatically generated">
+            <a:extLst>
+              <a:ext uri="{FF2B5EF4-FFF2-40B4-BE49-F238E27FC236}">
+                <a16:creationId xmlns:a16="http://schemas.microsoft.com/office/drawing/2014/main" id="{DB9C2ECC-C4FC-F7BE-893B-7CBEA70523F9}"/>
+              </a:ext>
+            </a:extLst>
+          </p:cNvPr>
+          <p:cNvPicPr>
+            <a:picLocks noChangeAspect="1"/>
+          </p:cNvPicPr>
+          <p:nvPr/>
+        </p:nvPicPr>
+        <p:blipFill rotWithShape="1">
+          <a:blip r:embed="rId4">
+            <a:extLst>
+              <a:ext uri="{28A0092B-C50C-407E-A947-70E740481C1C}">
+                <a14:useLocalDpi xmlns:a14="http://schemas.microsoft.com/office/drawing/2010/main" val="0"/>
+              </a:ext>
+            </a:extLst>
+          </a:blip>
+          <a:srcRect b="76996"/>
+          <a:stretch/>
+        </p:blipFill>
+        <p:spPr>
+          <a:xfrm>
+            <a:off x="202018" y="2729323"/>
+            <a:ext cx="11520082" cy="3242852"/>
+          </a:xfrm>
+          <a:prstGeom prst="rect">
+            <a:avLst/>
+          </a:prstGeom>
+        </p:spPr>
+      </p:pic>
     </p:spTree>
     <p:extLst>
       <p:ext uri="{BB962C8B-B14F-4D97-AF65-F5344CB8AC3E}">
         <p14:creationId xmlns:p14="http://schemas.microsoft.com/office/powerpoint/2010/main" val="2024582942"/>
+      </p:ext>
+    </p:extLst>
+  </p:cSld>
+  <p:clrMapOvr>
+    <a:masterClrMapping/>
+  </p:clrMapOvr>
+</p:sld>
+</file>
+
+<file path=ppt/slides/slide7.xml><?xml version="1.0" encoding="utf-8"?>
+<p:sld xmlns:a="http://schemas.openxmlformats.org/drawingml/2006/main" xmlns:r="http://schemas.openxmlformats.org/officeDocument/2006/relationships" xmlns:p="http://schemas.openxmlformats.org/presentationml/2006/main">
+  <p:cSld>
+    <p:spTree>
+      <p:nvGrpSpPr>
+        <p:cNvPr id="1" name=""/>
+        <p:cNvGrpSpPr/>
+        <p:nvPr/>
+      </p:nvGrpSpPr>
+      <p:grpSpPr>
+        <a:xfrm>
+          <a:off x="0" y="0"/>
+          <a:ext cx="0" cy="0"/>
+          <a:chOff x="0" y="0"/>
+          <a:chExt cx="0" cy="0"/>
+        </a:xfrm>
+      </p:grpSpPr>
+      <p:sp>
+        <p:nvSpPr>
+          <p:cNvPr id="2" name="Title 1">
+            <a:extLst>
+              <a:ext uri="{FF2B5EF4-FFF2-40B4-BE49-F238E27FC236}">
+                <a16:creationId xmlns:a16="http://schemas.microsoft.com/office/drawing/2014/main" id="{E948918B-607A-D68B-8FB7-16078C1EBA93}"/>
+              </a:ext>
+            </a:extLst>
+          </p:cNvPr>
+          <p:cNvSpPr>
+            <a:spLocks noGrp="1"/>
+          </p:cNvSpPr>
+          <p:nvPr>
+            <p:ph type="title"/>
+          </p:nvPr>
+        </p:nvSpPr>
+        <p:spPr/>
+        <p:txBody>
+          <a:bodyPr/>
+          <a:lstStyle/>
+          <a:p>
+            <a:r>
+              <a:rPr lang="en-US" dirty="0"/>
+              <a:t>The Interactive Dataset</a:t>
+            </a:r>
+          </a:p>
+        </p:txBody>
+      </p:sp>
+      <p:pic>
+        <p:nvPicPr>
+          <p:cNvPr id="13" name="Picture 12">
+            <a:extLst>
+              <a:ext uri="{FF2B5EF4-FFF2-40B4-BE49-F238E27FC236}">
+                <a16:creationId xmlns:a16="http://schemas.microsoft.com/office/drawing/2014/main" id="{689D9F17-4443-84A5-2FCA-9F38677F04D4}"/>
+              </a:ext>
+            </a:extLst>
+          </p:cNvPr>
+          <p:cNvPicPr>
+            <a:picLocks noChangeAspect="1"/>
+          </p:cNvPicPr>
+          <p:nvPr/>
+        </p:nvPicPr>
+        <p:blipFill>
+          <a:blip r:embed="rId2"/>
+          <a:stretch>
+            <a:fillRect/>
+          </a:stretch>
+        </p:blipFill>
+        <p:spPr>
+          <a:xfrm>
+            <a:off x="10285943" y="47799"/>
+            <a:ext cx="1906057" cy="1162748"/>
+          </a:xfrm>
+          <a:prstGeom prst="rect">
+            <a:avLst/>
+          </a:prstGeom>
+        </p:spPr>
+      </p:pic>
+      <p:sp>
+        <p:nvSpPr>
+          <p:cNvPr id="4" name="TextBox 3">
+            <a:extLst>
+              <a:ext uri="{FF2B5EF4-FFF2-40B4-BE49-F238E27FC236}">
+                <a16:creationId xmlns:a16="http://schemas.microsoft.com/office/drawing/2014/main" id="{972B816F-CBD8-5502-4587-CB2441502C24}"/>
+              </a:ext>
+            </a:extLst>
+          </p:cNvPr>
+          <p:cNvSpPr txBox="1"/>
+          <p:nvPr/>
+        </p:nvSpPr>
+        <p:spPr>
+          <a:xfrm>
+            <a:off x="468630" y="6326862"/>
+            <a:ext cx="6185916" cy="430887"/>
+          </a:xfrm>
+          <a:prstGeom prst="rect">
+            <a:avLst/>
+          </a:prstGeom>
+          <a:noFill/>
+        </p:spPr>
+        <p:txBody>
+          <a:bodyPr wrap="square">
+            <a:spAutoFit/>
+          </a:bodyPr>
+          <a:lstStyle/>
+          <a:p>
+            <a:r>
+              <a:rPr lang="en-US" sz="1050" b="0" i="1" dirty="0" err="1">
+                <a:solidFill>
+                  <a:srgbClr val="000000"/>
+                </a:solidFill>
+                <a:effectLst/>
+                <a:latin typeface="Hanken Grotesk"/>
+              </a:rPr>
+              <a:t>Zebrahub</a:t>
+            </a:r>
+            <a:r>
+              <a:rPr lang="en-US" sz="1050" b="0" i="1" dirty="0">
+                <a:solidFill>
+                  <a:srgbClr val="000000"/>
+                </a:solidFill>
+                <a:effectLst/>
+                <a:latin typeface="Hanken Grotesk"/>
+              </a:rPr>
+              <a:t> - Multimodal Zebrafish Developmental Atlas Reveals the State Transition Dynamics of Late Vertebrate Pluripotent Axial </a:t>
+            </a:r>
+            <a:r>
+              <a:rPr lang="en-US" sz="1050" b="0" i="0" u="none" strike="noStrike" dirty="0">
+                <a:solidFill>
+                  <a:srgbClr val="0D7CB5"/>
+                </a:solidFill>
+                <a:effectLst/>
+                <a:latin typeface="Hanken Grotesk"/>
+                <a:hlinkClick r:id="rId3" tooltip="zebrahub preprint"/>
+              </a:rPr>
+              <a:t>Progenitors</a:t>
+            </a:r>
+            <a:r>
+              <a:rPr lang="en-US" sz="1050" b="0" i="1" dirty="0">
+                <a:solidFill>
+                  <a:srgbClr val="000000"/>
+                </a:solidFill>
+                <a:effectLst/>
+                <a:latin typeface="Hanken Grotesk"/>
+              </a:rPr>
+              <a:t>.</a:t>
+            </a:r>
+            <a:r>
+              <a:rPr lang="en-US" sz="1050" b="0" i="0" dirty="0">
+                <a:solidFill>
+                  <a:srgbClr val="000000"/>
+                </a:solidFill>
+                <a:effectLst/>
+                <a:latin typeface="Hanken Grotesk"/>
+              </a:rPr>
+              <a:t> </a:t>
+            </a:r>
+            <a:r>
+              <a:rPr lang="en-US" sz="1050" b="1" i="0" dirty="0">
+                <a:solidFill>
+                  <a:srgbClr val="000000"/>
+                </a:solidFill>
+                <a:effectLst/>
+                <a:latin typeface="Hanken Grotesk"/>
+              </a:rPr>
+              <a:t>Lange et al. </a:t>
+            </a:r>
+            <a:r>
+              <a:rPr lang="en-US" sz="1050" b="1" i="0" dirty="0" err="1">
+                <a:solidFill>
+                  <a:srgbClr val="000000"/>
+                </a:solidFill>
+                <a:effectLst/>
+                <a:latin typeface="Hanken Grotesk"/>
+              </a:rPr>
+              <a:t>BioRxiv</a:t>
+            </a:r>
+            <a:r>
+              <a:rPr lang="en-US" sz="1050" b="1" i="0" dirty="0">
+                <a:solidFill>
+                  <a:srgbClr val="000000"/>
+                </a:solidFill>
+                <a:effectLst/>
+                <a:latin typeface="Hanken Grotesk"/>
+              </a:rPr>
+              <a:t> 2023.</a:t>
+            </a:r>
+            <a:endParaRPr lang="en-US" sz="1050" dirty="0"/>
+          </a:p>
+        </p:txBody>
+      </p:sp>
+      <p:sp>
+        <p:nvSpPr>
+          <p:cNvPr id="3" name="TextBox 2">
+            <a:extLst>
+              <a:ext uri="{FF2B5EF4-FFF2-40B4-BE49-F238E27FC236}">
+                <a16:creationId xmlns:a16="http://schemas.microsoft.com/office/drawing/2014/main" id="{1E3B99CA-5F61-032D-7B83-21CB2CFFB604}"/>
+              </a:ext>
+            </a:extLst>
+          </p:cNvPr>
+          <p:cNvSpPr txBox="1"/>
+          <p:nvPr/>
+        </p:nvSpPr>
+        <p:spPr>
+          <a:xfrm>
+            <a:off x="209550" y="638248"/>
+            <a:ext cx="5163208" cy="369332"/>
+          </a:xfrm>
+          <a:prstGeom prst="rect">
+            <a:avLst/>
+          </a:prstGeom>
+          <a:noFill/>
+        </p:spPr>
+        <p:txBody>
+          <a:bodyPr wrap="none" rtlCol="0">
+            <a:spAutoFit/>
+          </a:bodyPr>
+          <a:lstStyle/>
+          <a:p>
+            <a:r>
+              <a:rPr lang="en-US" dirty="0"/>
+              <a:t>Cell type annotated and embryonic tissue annotated.</a:t>
+            </a:r>
+          </a:p>
+        </p:txBody>
+      </p:sp>
+      <p:pic>
+        <p:nvPicPr>
+          <p:cNvPr id="14" name="Picture 13" descr="A close-up of a diagram&#10;&#10;Description automatically generated">
+            <a:extLst>
+              <a:ext uri="{FF2B5EF4-FFF2-40B4-BE49-F238E27FC236}">
+                <a16:creationId xmlns:a16="http://schemas.microsoft.com/office/drawing/2014/main" id="{03690914-3042-E946-282C-BCDE08D57757}"/>
+              </a:ext>
+            </a:extLst>
+          </p:cNvPr>
+          <p:cNvPicPr>
+            <a:picLocks noChangeAspect="1"/>
+          </p:cNvPicPr>
+          <p:nvPr/>
+        </p:nvPicPr>
+        <p:blipFill rotWithShape="1">
+          <a:blip r:embed="rId4">
+            <a:extLst>
+              <a:ext uri="{28A0092B-C50C-407E-A947-70E740481C1C}">
+                <a14:useLocalDpi xmlns:a14="http://schemas.microsoft.com/office/drawing/2010/main" val="0"/>
+              </a:ext>
+            </a:extLst>
+          </a:blip>
+          <a:srcRect b="32344"/>
+          <a:stretch/>
+        </p:blipFill>
+        <p:spPr>
+          <a:xfrm>
+            <a:off x="342899" y="1385987"/>
+            <a:ext cx="6677025" cy="3963342"/>
+          </a:xfrm>
+          <a:prstGeom prst="rect">
+            <a:avLst/>
+          </a:prstGeom>
+        </p:spPr>
+      </p:pic>
+      <p:sp>
+        <p:nvSpPr>
+          <p:cNvPr id="15" name="Rectangle 14">
+            <a:extLst>
+              <a:ext uri="{FF2B5EF4-FFF2-40B4-BE49-F238E27FC236}">
+                <a16:creationId xmlns:a16="http://schemas.microsoft.com/office/drawing/2014/main" id="{93E5A1EA-634F-667D-831D-F47CD452D31A}"/>
+              </a:ext>
+            </a:extLst>
+          </p:cNvPr>
+          <p:cNvSpPr/>
+          <p:nvPr/>
+        </p:nvSpPr>
+        <p:spPr>
+          <a:xfrm>
+            <a:off x="5800725" y="3429000"/>
+            <a:ext cx="1123950" cy="1533525"/>
+          </a:xfrm>
+          <a:prstGeom prst="rect">
+            <a:avLst/>
+          </a:prstGeom>
+          <a:solidFill>
+            <a:schemeClr val="bg1"/>
+          </a:solidFill>
+          <a:ln>
+            <a:noFill/>
+          </a:ln>
+        </p:spPr>
+        <p:style>
+          <a:lnRef idx="2">
+            <a:schemeClr val="accent1">
+              <a:shade val="15000"/>
+            </a:schemeClr>
+          </a:lnRef>
+          <a:fillRef idx="1">
+            <a:schemeClr val="accent1"/>
+          </a:fillRef>
+          <a:effectRef idx="0">
+            <a:schemeClr val="accent1"/>
+          </a:effectRef>
+          <a:fontRef idx="minor">
+            <a:schemeClr val="lt1"/>
+          </a:fontRef>
+        </p:style>
+        <p:txBody>
+          <a:bodyPr rtlCol="0" anchor="ctr"/>
+          <a:lstStyle/>
+          <a:p>
+            <a:pPr algn="ctr"/>
+            <a:endParaRPr lang="en-US"/>
+          </a:p>
+        </p:txBody>
+      </p:sp>
+      <p:pic>
+        <p:nvPicPr>
+          <p:cNvPr id="6" name="Picture 5" descr="A screenshot of a computer screen&#10;&#10;Description automatically generated">
+            <a:extLst>
+              <a:ext uri="{FF2B5EF4-FFF2-40B4-BE49-F238E27FC236}">
+                <a16:creationId xmlns:a16="http://schemas.microsoft.com/office/drawing/2014/main" id="{619A70D1-8AA2-2228-9767-88866CDD67B8}"/>
+              </a:ext>
+            </a:extLst>
+          </p:cNvPr>
+          <p:cNvPicPr>
+            <a:picLocks noChangeAspect="1"/>
+          </p:cNvPicPr>
+          <p:nvPr/>
+        </p:nvPicPr>
+        <p:blipFill rotWithShape="1">
+          <a:blip r:embed="rId5">
+            <a:extLst>
+              <a:ext uri="{28A0092B-C50C-407E-A947-70E740481C1C}">
+                <a14:useLocalDpi xmlns:a14="http://schemas.microsoft.com/office/drawing/2010/main" val="0"/>
+              </a:ext>
+            </a:extLst>
+          </a:blip>
+          <a:srcRect l="48470" t="23475" b="44320"/>
+          <a:stretch/>
+        </p:blipFill>
+        <p:spPr>
+          <a:xfrm>
+            <a:off x="6380226" y="2413228"/>
+            <a:ext cx="5811774" cy="4444772"/>
+          </a:xfrm>
+          <a:prstGeom prst="rect">
+            <a:avLst/>
+          </a:prstGeom>
+        </p:spPr>
+      </p:pic>
+    </p:spTree>
+    <p:extLst>
+      <p:ext uri="{BB962C8B-B14F-4D97-AF65-F5344CB8AC3E}">
+        <p14:creationId xmlns:p14="http://schemas.microsoft.com/office/powerpoint/2010/main" val="4220337533"/>
       </p:ext>
     </p:extLst>
   </p:cSld>

</xml_diff>